<commit_message>
Removed Retract arms button from XBox Controller layout
</commit_message>
<xml_diff>
--- a/2018FRCRobot/2018 XBox Controller.pptx
+++ b/2018FRCRobot/2018 XBox Controller.pptx
@@ -114,10 +114,6 @@
 </p:presentation>
 </file>
 
-<file path=ppt/revisionInfo.xml><?xml version="1.0" encoding="utf-8"?>
-<p1510:revInfo xmlns:a="http://schemas.openxmlformats.org/drawingml/2006/main" xmlns:r="http://schemas.openxmlformats.org/officeDocument/2006/relationships" xmlns:p1510="http://schemas.microsoft.com/office/powerpoint/2015/10/main"/>
-</file>
-
 <file path=ppt/slideLayouts/slideLayout1.xml><?xml version="1.0" encoding="utf-8"?>
 <p:sldLayout xmlns:a="http://schemas.openxmlformats.org/drawingml/2006/main" xmlns:r="http://schemas.openxmlformats.org/officeDocument/2006/relationships" xmlns:p="http://schemas.openxmlformats.org/presentationml/2006/main" type="title" preserve="1">
   <p:cSld name="Title Slide">
@@ -247,7 +243,7 @@
           <a:p>
             <a:fld id="{2B51A96A-9333-4C31-8B0E-1C735D0B26DA}" type="datetimeFigureOut">
               <a:rPr lang="en-US" smtClean="0"/>
-              <a:t>2/3/2018</a:t>
+              <a:t>2/20/2018</a:t>
             </a:fld>
             <a:endParaRPr lang="en-US"/>
           </a:p>
@@ -415,7 +411,7 @@
           <a:p>
             <a:fld id="{2B51A96A-9333-4C31-8B0E-1C735D0B26DA}" type="datetimeFigureOut">
               <a:rPr lang="en-US" smtClean="0"/>
-              <a:t>2/3/2018</a:t>
+              <a:t>2/20/2018</a:t>
             </a:fld>
             <a:endParaRPr lang="en-US"/>
           </a:p>
@@ -593,7 +589,7 @@
           <a:p>
             <a:fld id="{2B51A96A-9333-4C31-8B0E-1C735D0B26DA}" type="datetimeFigureOut">
               <a:rPr lang="en-US" smtClean="0"/>
-              <a:t>2/3/2018</a:t>
+              <a:t>2/20/2018</a:t>
             </a:fld>
             <a:endParaRPr lang="en-US"/>
           </a:p>
@@ -761,7 +757,7 @@
           <a:p>
             <a:fld id="{2B51A96A-9333-4C31-8B0E-1C735D0B26DA}" type="datetimeFigureOut">
               <a:rPr lang="en-US" smtClean="0"/>
-              <a:t>2/3/2018</a:t>
+              <a:t>2/20/2018</a:t>
             </a:fld>
             <a:endParaRPr lang="en-US"/>
           </a:p>
@@ -1006,7 +1002,7 @@
           <a:p>
             <a:fld id="{2B51A96A-9333-4C31-8B0E-1C735D0B26DA}" type="datetimeFigureOut">
               <a:rPr lang="en-US" smtClean="0"/>
-              <a:t>2/3/2018</a:t>
+              <a:t>2/20/2018</a:t>
             </a:fld>
             <a:endParaRPr lang="en-US"/>
           </a:p>
@@ -1235,7 +1231,7 @@
           <a:p>
             <a:fld id="{2B51A96A-9333-4C31-8B0E-1C735D0B26DA}" type="datetimeFigureOut">
               <a:rPr lang="en-US" smtClean="0"/>
-              <a:t>2/3/2018</a:t>
+              <a:t>2/20/2018</a:t>
             </a:fld>
             <a:endParaRPr lang="en-US"/>
           </a:p>
@@ -1599,7 +1595,7 @@
           <a:p>
             <a:fld id="{2B51A96A-9333-4C31-8B0E-1C735D0B26DA}" type="datetimeFigureOut">
               <a:rPr lang="en-US" smtClean="0"/>
-              <a:t>2/3/2018</a:t>
+              <a:t>2/20/2018</a:t>
             </a:fld>
             <a:endParaRPr lang="en-US"/>
           </a:p>
@@ -1716,7 +1712,7 @@
           <a:p>
             <a:fld id="{2B51A96A-9333-4C31-8B0E-1C735D0B26DA}" type="datetimeFigureOut">
               <a:rPr lang="en-US" smtClean="0"/>
-              <a:t>2/3/2018</a:t>
+              <a:t>2/20/2018</a:t>
             </a:fld>
             <a:endParaRPr lang="en-US"/>
           </a:p>
@@ -1811,7 +1807,7 @@
           <a:p>
             <a:fld id="{2B51A96A-9333-4C31-8B0E-1C735D0B26DA}" type="datetimeFigureOut">
               <a:rPr lang="en-US" smtClean="0"/>
-              <a:t>2/3/2018</a:t>
+              <a:t>2/20/2018</a:t>
             </a:fld>
             <a:endParaRPr lang="en-US"/>
           </a:p>
@@ -2086,7 +2082,7 @@
           <a:p>
             <a:fld id="{2B51A96A-9333-4C31-8B0E-1C735D0B26DA}" type="datetimeFigureOut">
               <a:rPr lang="en-US" smtClean="0"/>
-              <a:t>2/3/2018</a:t>
+              <a:t>2/20/2018</a:t>
             </a:fld>
             <a:endParaRPr lang="en-US"/>
           </a:p>
@@ -2338,7 +2334,7 @@
           <a:p>
             <a:fld id="{2B51A96A-9333-4C31-8B0E-1C735D0B26DA}" type="datetimeFigureOut">
               <a:rPr lang="en-US" smtClean="0"/>
-              <a:t>2/3/2018</a:t>
+              <a:t>2/20/2018</a:t>
             </a:fld>
             <a:endParaRPr lang="en-US"/>
           </a:p>
@@ -2549,7 +2545,7 @@
           <a:p>
             <a:fld id="{2B51A96A-9333-4C31-8B0E-1C735D0B26DA}" type="datetimeFigureOut">
               <a:rPr lang="en-US" smtClean="0"/>
-              <a:t>2/3/2018</a:t>
+              <a:t>2/20/2018</a:t>
             </a:fld>
             <a:endParaRPr lang="en-US"/>
           </a:p>
@@ -3335,35 +3331,6 @@
       </p:pic>
       <p:sp>
         <p:nvSpPr>
-          <p:cNvPr id="7" name="TextBox 6"/>
-          <p:cNvSpPr txBox="1"/>
-          <p:nvPr/>
-        </p:nvSpPr>
-        <p:spPr>
-          <a:xfrm>
-            <a:off x="9450864" y="4296906"/>
-            <a:ext cx="2370392" cy="369332"/>
-          </a:xfrm>
-          <a:prstGeom prst="rect">
-            <a:avLst/>
-          </a:prstGeom>
-          <a:noFill/>
-        </p:spPr>
-        <p:txBody>
-          <a:bodyPr wrap="none" rtlCol="0">
-            <a:spAutoFit/>
-          </a:bodyPr>
-          <a:lstStyle/>
-          <a:p>
-            <a:r>
-              <a:rPr lang="en-US" dirty="0"/>
-              <a:t>Toggle Arms In and Out</a:t>
-            </a:r>
-          </a:p>
-        </p:txBody>
-      </p:sp>
-      <p:sp>
-        <p:nvSpPr>
           <p:cNvPr id="8" name="TextBox 7"/>
           <p:cNvSpPr txBox="1"/>
           <p:nvPr/>
@@ -3585,39 +3552,6 @@
           <a:xfrm flipH="1">
             <a:off x="8361405" y="1725512"/>
             <a:ext cx="1277895" cy="459380"/>
-          </a:xfrm>
-          <a:prstGeom prst="line">
-            <a:avLst/>
-          </a:prstGeom>
-          <a:ln w="28575"/>
-        </p:spPr>
-        <p:style>
-          <a:lnRef idx="1">
-            <a:schemeClr val="accent1"/>
-          </a:lnRef>
-          <a:fillRef idx="0">
-            <a:schemeClr val="accent1"/>
-          </a:fillRef>
-          <a:effectRef idx="0">
-            <a:schemeClr val="accent1"/>
-          </a:effectRef>
-          <a:fontRef idx="minor">
-            <a:schemeClr val="tx1"/>
-          </a:fontRef>
-        </p:style>
-      </p:cxnSp>
-      <p:cxnSp>
-        <p:nvCxnSpPr>
-          <p:cNvPr id="30" name="Straight Connector 29"/>
-          <p:cNvCxnSpPr>
-            <a:cxnSpLocks/>
-          </p:cNvCxnSpPr>
-          <p:nvPr/>
-        </p:nvCxnSpPr>
-        <p:spPr>
-          <a:xfrm flipH="1" flipV="1">
-            <a:off x="8038214" y="3880884"/>
-            <a:ext cx="1667731" cy="702828"/>
           </a:xfrm>
           <a:prstGeom prst="line">
             <a:avLst/>
@@ -3886,35 +3820,6 @@
       </p:pic>
       <p:sp>
         <p:nvSpPr>
-          <p:cNvPr id="5" name="TextBox 4"/>
-          <p:cNvSpPr txBox="1"/>
-          <p:nvPr/>
-        </p:nvSpPr>
-        <p:spPr>
-          <a:xfrm>
-            <a:off x="9597691" y="4677015"/>
-            <a:ext cx="2335126" cy="369332"/>
-          </a:xfrm>
-          <a:prstGeom prst="rect">
-            <a:avLst/>
-          </a:prstGeom>
-          <a:noFill/>
-        </p:spPr>
-        <p:txBody>
-          <a:bodyPr wrap="none" rtlCol="0">
-            <a:spAutoFit/>
-          </a:bodyPr>
-          <a:lstStyle/>
-          <a:p>
-            <a:r>
-              <a:rPr lang="en-US" dirty="0"/>
-              <a:t>Toggle Arms in and out</a:t>
-            </a:r>
-          </a:p>
-        </p:txBody>
-      </p:sp>
-      <p:sp>
-        <p:nvSpPr>
           <p:cNvPr id="7" name="TextBox 6"/>
           <p:cNvSpPr txBox="1"/>
           <p:nvPr/>
@@ -4453,40 +4358,6 @@
           <a:xfrm flipH="1">
             <a:off x="8114272" y="2323159"/>
             <a:ext cx="1336592" cy="642463"/>
-          </a:xfrm>
-          <a:prstGeom prst="line">
-            <a:avLst/>
-          </a:prstGeom>
-          <a:ln w="28575"/>
-        </p:spPr>
-        <p:style>
-          <a:lnRef idx="1">
-            <a:schemeClr val="accent1"/>
-          </a:lnRef>
-          <a:fillRef idx="0">
-            <a:schemeClr val="accent1"/>
-          </a:fillRef>
-          <a:effectRef idx="0">
-            <a:schemeClr val="accent1"/>
-          </a:effectRef>
-          <a:fontRef idx="minor">
-            <a:schemeClr val="tx1"/>
-          </a:fontRef>
-        </p:style>
-      </p:cxnSp>
-      <p:cxnSp>
-        <p:nvCxnSpPr>
-          <p:cNvPr id="34" name="Straight Connector 33"/>
-          <p:cNvCxnSpPr>
-            <a:cxnSpLocks/>
-            <a:stCxn id="5" idx="0"/>
-          </p:cNvCxnSpPr>
-          <p:nvPr/>
-        </p:nvCxnSpPr>
-        <p:spPr>
-          <a:xfrm flipH="1" flipV="1">
-            <a:off x="8114272" y="3854136"/>
-            <a:ext cx="2650982" cy="822879"/>
           </a:xfrm>
           <a:prstGeom prst="line">
             <a:avLst/>

</xml_diff>

<commit_message>
Added to the diagram that BOTH X Button and Back button
</commit_message>
<xml_diff>
--- a/2018FRCRobot/2018 XBox Controller.pptx
+++ b/2018FRCRobot/2018 XBox Controller.pptx
@@ -243,7 +243,7 @@
           <a:p>
             <a:fld id="{2B51A96A-9333-4C31-8B0E-1C735D0B26DA}" type="datetimeFigureOut">
               <a:rPr lang="en-US" smtClean="0"/>
-              <a:t>2/20/2018</a:t>
+              <a:t>2/22/2018</a:t>
             </a:fld>
             <a:endParaRPr lang="en-US"/>
           </a:p>
@@ -411,7 +411,7 @@
           <a:p>
             <a:fld id="{2B51A96A-9333-4C31-8B0E-1C735D0B26DA}" type="datetimeFigureOut">
               <a:rPr lang="en-US" smtClean="0"/>
-              <a:t>2/20/2018</a:t>
+              <a:t>2/22/2018</a:t>
             </a:fld>
             <a:endParaRPr lang="en-US"/>
           </a:p>
@@ -589,7 +589,7 @@
           <a:p>
             <a:fld id="{2B51A96A-9333-4C31-8B0E-1C735D0B26DA}" type="datetimeFigureOut">
               <a:rPr lang="en-US" smtClean="0"/>
-              <a:t>2/20/2018</a:t>
+              <a:t>2/22/2018</a:t>
             </a:fld>
             <a:endParaRPr lang="en-US"/>
           </a:p>
@@ -757,7 +757,7 @@
           <a:p>
             <a:fld id="{2B51A96A-9333-4C31-8B0E-1C735D0B26DA}" type="datetimeFigureOut">
               <a:rPr lang="en-US" smtClean="0"/>
-              <a:t>2/20/2018</a:t>
+              <a:t>2/22/2018</a:t>
             </a:fld>
             <a:endParaRPr lang="en-US"/>
           </a:p>
@@ -1002,7 +1002,7 @@
           <a:p>
             <a:fld id="{2B51A96A-9333-4C31-8B0E-1C735D0B26DA}" type="datetimeFigureOut">
               <a:rPr lang="en-US" smtClean="0"/>
-              <a:t>2/20/2018</a:t>
+              <a:t>2/22/2018</a:t>
             </a:fld>
             <a:endParaRPr lang="en-US"/>
           </a:p>
@@ -1231,7 +1231,7 @@
           <a:p>
             <a:fld id="{2B51A96A-9333-4C31-8B0E-1C735D0B26DA}" type="datetimeFigureOut">
               <a:rPr lang="en-US" smtClean="0"/>
-              <a:t>2/20/2018</a:t>
+              <a:t>2/22/2018</a:t>
             </a:fld>
             <a:endParaRPr lang="en-US"/>
           </a:p>
@@ -1595,7 +1595,7 @@
           <a:p>
             <a:fld id="{2B51A96A-9333-4C31-8B0E-1C735D0B26DA}" type="datetimeFigureOut">
               <a:rPr lang="en-US" smtClean="0"/>
-              <a:t>2/20/2018</a:t>
+              <a:t>2/22/2018</a:t>
             </a:fld>
             <a:endParaRPr lang="en-US"/>
           </a:p>
@@ -1712,7 +1712,7 @@
           <a:p>
             <a:fld id="{2B51A96A-9333-4C31-8B0E-1C735D0B26DA}" type="datetimeFigureOut">
               <a:rPr lang="en-US" smtClean="0"/>
-              <a:t>2/20/2018</a:t>
+              <a:t>2/22/2018</a:t>
             </a:fld>
             <a:endParaRPr lang="en-US"/>
           </a:p>
@@ -1807,7 +1807,7 @@
           <a:p>
             <a:fld id="{2B51A96A-9333-4C31-8B0E-1C735D0B26DA}" type="datetimeFigureOut">
               <a:rPr lang="en-US" smtClean="0"/>
-              <a:t>2/20/2018</a:t>
+              <a:t>2/22/2018</a:t>
             </a:fld>
             <a:endParaRPr lang="en-US"/>
           </a:p>
@@ -2082,7 +2082,7 @@
           <a:p>
             <a:fld id="{2B51A96A-9333-4C31-8B0E-1C735D0B26DA}" type="datetimeFigureOut">
               <a:rPr lang="en-US" smtClean="0"/>
-              <a:t>2/20/2018</a:t>
+              <a:t>2/22/2018</a:t>
             </a:fld>
             <a:endParaRPr lang="en-US"/>
           </a:p>
@@ -2334,7 +2334,7 @@
           <a:p>
             <a:fld id="{2B51A96A-9333-4C31-8B0E-1C735D0B26DA}" type="datetimeFigureOut">
               <a:rPr lang="en-US" smtClean="0"/>
-              <a:t>2/20/2018</a:t>
+              <a:t>2/22/2018</a:t>
             </a:fld>
             <a:endParaRPr lang="en-US"/>
           </a:p>
@@ -2545,7 +2545,7 @@
           <a:p>
             <a:fld id="{2B51A96A-9333-4C31-8B0E-1C735D0B26DA}" type="datetimeFigureOut">
               <a:rPr lang="en-US" smtClean="0"/>
-              <a:t>2/20/2018</a:t>
+              <a:t>2/22/2018</a:t>
             </a:fld>
             <a:endParaRPr lang="en-US"/>
           </a:p>
@@ -3622,8 +3622,8 @@
         </p:nvSpPr>
         <p:spPr>
           <a:xfrm>
-            <a:off x="9248156" y="2529181"/>
-            <a:ext cx="1377621" cy="369332"/>
+            <a:off x="5407189" y="2109428"/>
+            <a:ext cx="1475660" cy="646331"/>
           </a:xfrm>
           <a:prstGeom prst="rect">
             <a:avLst/>
@@ -3636,9 +3636,17 @@
           </a:bodyPr>
           <a:lstStyle/>
           <a:p>
+            <a:pPr algn="ctr"/>
             <a:r>
               <a:rPr lang="en-US" dirty="0"/>
               <a:t>Lower Robot</a:t>
+            </a:r>
+          </a:p>
+          <a:p>
+            <a:pPr algn="ctr"/>
+            <a:r>
+              <a:rPr lang="en-US" dirty="0"/>
+              <a:t>At Same Time</a:t>
             </a:r>
           </a:p>
         </p:txBody>
@@ -3689,14 +3697,14 @@
           </p:cNvPr>
           <p:cNvCxnSpPr>
             <a:cxnSpLocks/>
-            <a:stCxn id="33" idx="1"/>
+            <a:stCxn id="33" idx="2"/>
           </p:cNvCxnSpPr>
           <p:nvPr/>
         </p:nvCxnSpPr>
         <p:spPr>
           <a:xfrm flipH="1">
-            <a:off x="7708605" y="2713847"/>
-            <a:ext cx="1539551" cy="715153"/>
+            <a:off x="5516217" y="2755759"/>
+            <a:ext cx="628802" cy="553971"/>
           </a:xfrm>
           <a:prstGeom prst="line">
             <a:avLst/>
@@ -3737,6 +3745,46 @@
           <a:xfrm flipH="1">
             <a:off x="8038214" y="2254467"/>
             <a:ext cx="1209942" cy="636550"/>
+          </a:xfrm>
+          <a:prstGeom prst="line">
+            <a:avLst/>
+          </a:prstGeom>
+          <a:ln w="28575"/>
+        </p:spPr>
+        <p:style>
+          <a:lnRef idx="1">
+            <a:schemeClr val="accent1"/>
+          </a:lnRef>
+          <a:fillRef idx="0">
+            <a:schemeClr val="accent1"/>
+          </a:fillRef>
+          <a:effectRef idx="0">
+            <a:schemeClr val="accent1"/>
+          </a:effectRef>
+          <a:fontRef idx="minor">
+            <a:schemeClr val="tx1"/>
+          </a:fontRef>
+        </p:style>
+      </p:cxnSp>
+      <p:cxnSp>
+        <p:nvCxnSpPr>
+          <p:cNvPr id="18" name="Straight Connector 17">
+            <a:extLst>
+              <a:ext uri="{FF2B5EF4-FFF2-40B4-BE49-F238E27FC236}">
+                <a16:creationId xmlns:a16="http://schemas.microsoft.com/office/drawing/2014/main" id="{075931A9-7D3A-4A48-AC42-239B75BC50C5}"/>
+              </a:ext>
+            </a:extLst>
+          </p:cNvPr>
+          <p:cNvCxnSpPr>
+            <a:cxnSpLocks/>
+            <a:stCxn id="33" idx="2"/>
+          </p:cNvCxnSpPr>
+          <p:nvPr/>
+        </p:nvCxnSpPr>
+        <p:spPr>
+          <a:xfrm>
+            <a:off x="6145019" y="2755759"/>
+            <a:ext cx="1236126" cy="553971"/>
           </a:xfrm>
           <a:prstGeom prst="line">
             <a:avLst/>
@@ -4416,10 +4464,10 @@
       </p:sp>
       <p:sp>
         <p:nvSpPr>
-          <p:cNvPr id="33" name="TextBox 32">
+          <p:cNvPr id="24" name="TextBox 23">
             <a:extLst>
               <a:ext uri="{FF2B5EF4-FFF2-40B4-BE49-F238E27FC236}">
-                <a16:creationId xmlns:a16="http://schemas.microsoft.com/office/drawing/2014/main" id="{11FD0E9C-BE40-4743-ABF6-2D8DA31EFF88}"/>
+                <a16:creationId xmlns:a16="http://schemas.microsoft.com/office/drawing/2014/main" id="{4B1AACE2-73BA-4E8B-9D4E-1538F93D343F}"/>
               </a:ext>
             </a:extLst>
           </p:cNvPr>
@@ -4428,8 +4476,8 @@
         </p:nvSpPr>
         <p:spPr>
           <a:xfrm>
-            <a:off x="9450864" y="2467793"/>
-            <a:ext cx="1377621" cy="369332"/>
+            <a:off x="5407189" y="2109428"/>
+            <a:ext cx="1475660" cy="646331"/>
           </a:xfrm>
           <a:prstGeom prst="rect">
             <a:avLst/>
@@ -4442,32 +4490,80 @@
           </a:bodyPr>
           <a:lstStyle/>
           <a:p>
+            <a:pPr algn="ctr"/>
             <a:r>
               <a:rPr lang="en-US" dirty="0"/>
               <a:t>Lower Robot</a:t>
             </a:r>
           </a:p>
+          <a:p>
+            <a:pPr algn="ctr"/>
+            <a:r>
+              <a:rPr lang="en-US" dirty="0"/>
+              <a:t>At Same Time</a:t>
+            </a:r>
+          </a:p>
         </p:txBody>
       </p:sp>
       <p:cxnSp>
         <p:nvCxnSpPr>
-          <p:cNvPr id="35" name="Straight Connector 34">
+          <p:cNvPr id="25" name="Straight Connector 24">
             <a:extLst>
               <a:ext uri="{FF2B5EF4-FFF2-40B4-BE49-F238E27FC236}">
-                <a16:creationId xmlns:a16="http://schemas.microsoft.com/office/drawing/2014/main" id="{F656638B-919D-4D1E-817E-4C4E622D0804}"/>
+                <a16:creationId xmlns:a16="http://schemas.microsoft.com/office/drawing/2014/main" id="{D01C3A07-B5CA-4602-A36B-ECF58D1C0B3B}"/>
               </a:ext>
             </a:extLst>
           </p:cNvPr>
           <p:cNvCxnSpPr>
             <a:cxnSpLocks/>
-            <a:stCxn id="33" idx="1"/>
+            <a:stCxn id="24" idx="2"/>
           </p:cNvCxnSpPr>
           <p:nvPr/>
         </p:nvCxnSpPr>
         <p:spPr>
           <a:xfrm flipH="1">
-            <a:off x="7648207" y="2652459"/>
-            <a:ext cx="1802657" cy="750289"/>
+            <a:off x="5516217" y="2755759"/>
+            <a:ext cx="628802" cy="553971"/>
+          </a:xfrm>
+          <a:prstGeom prst="line">
+            <a:avLst/>
+          </a:prstGeom>
+          <a:ln w="28575"/>
+        </p:spPr>
+        <p:style>
+          <a:lnRef idx="1">
+            <a:schemeClr val="accent1"/>
+          </a:lnRef>
+          <a:fillRef idx="0">
+            <a:schemeClr val="accent1"/>
+          </a:fillRef>
+          <a:effectRef idx="0">
+            <a:schemeClr val="accent1"/>
+          </a:effectRef>
+          <a:fontRef idx="minor">
+            <a:schemeClr val="tx1"/>
+          </a:fontRef>
+        </p:style>
+      </p:cxnSp>
+      <p:cxnSp>
+        <p:nvCxnSpPr>
+          <p:cNvPr id="27" name="Straight Connector 26">
+            <a:extLst>
+              <a:ext uri="{FF2B5EF4-FFF2-40B4-BE49-F238E27FC236}">
+                <a16:creationId xmlns:a16="http://schemas.microsoft.com/office/drawing/2014/main" id="{232FF6B7-7D40-4E7F-BDA3-8A4BBEA61528}"/>
+              </a:ext>
+            </a:extLst>
+          </p:cNvPr>
+          <p:cNvCxnSpPr>
+            <a:cxnSpLocks/>
+            <a:stCxn id="24" idx="2"/>
+          </p:cNvCxnSpPr>
+          <p:nvPr/>
+        </p:nvCxnSpPr>
+        <p:spPr>
+          <a:xfrm>
+            <a:off x="6145019" y="2755759"/>
+            <a:ext cx="1236126" cy="553971"/>
           </a:xfrm>
           <a:prstGeom prst="line">
             <a:avLst/>

</xml_diff>

<commit_message>
Updated controller mapping in PPT
</commit_message>
<xml_diff>
--- a/2018FRCRobot/2018 XBox Controller.pptx
+++ b/2018FRCRobot/2018 XBox Controller.pptx
@@ -243,7 +243,7 @@
           <a:p>
             <a:fld id="{2B51A96A-9333-4C31-8B0E-1C735D0B26DA}" type="datetimeFigureOut">
               <a:rPr lang="en-US" smtClean="0"/>
-              <a:t>2/22/2018</a:t>
+              <a:t>4/6/2018</a:t>
             </a:fld>
             <a:endParaRPr lang="en-US"/>
           </a:p>
@@ -411,7 +411,7 @@
           <a:p>
             <a:fld id="{2B51A96A-9333-4C31-8B0E-1C735D0B26DA}" type="datetimeFigureOut">
               <a:rPr lang="en-US" smtClean="0"/>
-              <a:t>2/22/2018</a:t>
+              <a:t>4/6/2018</a:t>
             </a:fld>
             <a:endParaRPr lang="en-US"/>
           </a:p>
@@ -589,7 +589,7 @@
           <a:p>
             <a:fld id="{2B51A96A-9333-4C31-8B0E-1C735D0B26DA}" type="datetimeFigureOut">
               <a:rPr lang="en-US" smtClean="0"/>
-              <a:t>2/22/2018</a:t>
+              <a:t>4/6/2018</a:t>
             </a:fld>
             <a:endParaRPr lang="en-US"/>
           </a:p>
@@ -757,7 +757,7 @@
           <a:p>
             <a:fld id="{2B51A96A-9333-4C31-8B0E-1C735D0B26DA}" type="datetimeFigureOut">
               <a:rPr lang="en-US" smtClean="0"/>
-              <a:t>2/22/2018</a:t>
+              <a:t>4/6/2018</a:t>
             </a:fld>
             <a:endParaRPr lang="en-US"/>
           </a:p>
@@ -1002,7 +1002,7 @@
           <a:p>
             <a:fld id="{2B51A96A-9333-4C31-8B0E-1C735D0B26DA}" type="datetimeFigureOut">
               <a:rPr lang="en-US" smtClean="0"/>
-              <a:t>2/22/2018</a:t>
+              <a:t>4/6/2018</a:t>
             </a:fld>
             <a:endParaRPr lang="en-US"/>
           </a:p>
@@ -1231,7 +1231,7 @@
           <a:p>
             <a:fld id="{2B51A96A-9333-4C31-8B0E-1C735D0B26DA}" type="datetimeFigureOut">
               <a:rPr lang="en-US" smtClean="0"/>
-              <a:t>2/22/2018</a:t>
+              <a:t>4/6/2018</a:t>
             </a:fld>
             <a:endParaRPr lang="en-US"/>
           </a:p>
@@ -1595,7 +1595,7 @@
           <a:p>
             <a:fld id="{2B51A96A-9333-4C31-8B0E-1C735D0B26DA}" type="datetimeFigureOut">
               <a:rPr lang="en-US" smtClean="0"/>
-              <a:t>2/22/2018</a:t>
+              <a:t>4/6/2018</a:t>
             </a:fld>
             <a:endParaRPr lang="en-US"/>
           </a:p>
@@ -1712,7 +1712,7 @@
           <a:p>
             <a:fld id="{2B51A96A-9333-4C31-8B0E-1C735D0B26DA}" type="datetimeFigureOut">
               <a:rPr lang="en-US" smtClean="0"/>
-              <a:t>2/22/2018</a:t>
+              <a:t>4/6/2018</a:t>
             </a:fld>
             <a:endParaRPr lang="en-US"/>
           </a:p>
@@ -1807,7 +1807,7 @@
           <a:p>
             <a:fld id="{2B51A96A-9333-4C31-8B0E-1C735D0B26DA}" type="datetimeFigureOut">
               <a:rPr lang="en-US" smtClean="0"/>
-              <a:t>2/22/2018</a:t>
+              <a:t>4/6/2018</a:t>
             </a:fld>
             <a:endParaRPr lang="en-US"/>
           </a:p>
@@ -2082,7 +2082,7 @@
           <a:p>
             <a:fld id="{2B51A96A-9333-4C31-8B0E-1C735D0B26DA}" type="datetimeFigureOut">
               <a:rPr lang="en-US" smtClean="0"/>
-              <a:t>2/22/2018</a:t>
+              <a:t>4/6/2018</a:t>
             </a:fld>
             <a:endParaRPr lang="en-US"/>
           </a:p>
@@ -2334,7 +2334,7 @@
           <a:p>
             <a:fld id="{2B51A96A-9333-4C31-8B0E-1C735D0B26DA}" type="datetimeFigureOut">
               <a:rPr lang="en-US" smtClean="0"/>
-              <a:t>2/22/2018</a:t>
+              <a:t>4/6/2018</a:t>
             </a:fld>
             <a:endParaRPr lang="en-US"/>
           </a:p>
@@ -2545,7 +2545,7 @@
           <a:p>
             <a:fld id="{2B51A96A-9333-4C31-8B0E-1C735D0B26DA}" type="datetimeFigureOut">
               <a:rPr lang="en-US" smtClean="0"/>
-              <a:t>2/22/2018</a:t>
+              <a:t>4/6/2018</a:t>
             </a:fld>
             <a:endParaRPr lang="en-US"/>
           </a:p>
@@ -3411,7 +3411,7 @@
           <a:p>
             <a:r>
               <a:rPr lang="en-US" dirty="0"/>
-              <a:t>Split Boxes Out</a:t>
+              <a:t>Spit Boxes Out</a:t>
             </a:r>
           </a:p>
         </p:txBody>
@@ -3806,6 +3806,195 @@
           </a:fontRef>
         </p:style>
       </p:cxnSp>
+      <p:cxnSp>
+        <p:nvCxnSpPr>
+          <p:cNvPr id="17" name="Straight Connector 16">
+            <a:extLst>
+              <a:ext uri="{FF2B5EF4-FFF2-40B4-BE49-F238E27FC236}">
+                <a16:creationId xmlns:a16="http://schemas.microsoft.com/office/drawing/2014/main" id="{8DED3EB5-519A-43FC-8593-B29FFB707429}"/>
+              </a:ext>
+            </a:extLst>
+          </p:cNvPr>
+          <p:cNvCxnSpPr>
+            <a:cxnSpLocks/>
+            <a:stCxn id="4" idx="0"/>
+          </p:cNvCxnSpPr>
+          <p:nvPr/>
+        </p:nvCxnSpPr>
+        <p:spPr>
+          <a:xfrm>
+            <a:off x="6096000" y="1047750"/>
+            <a:ext cx="1743994" cy="654690"/>
+          </a:xfrm>
+          <a:prstGeom prst="line">
+            <a:avLst/>
+          </a:prstGeom>
+          <a:ln w="28575"/>
+        </p:spPr>
+        <p:style>
+          <a:lnRef idx="1">
+            <a:schemeClr val="accent1"/>
+          </a:lnRef>
+          <a:fillRef idx="0">
+            <a:schemeClr val="accent1"/>
+          </a:fillRef>
+          <a:effectRef idx="0">
+            <a:schemeClr val="accent1"/>
+          </a:effectRef>
+          <a:fontRef idx="minor">
+            <a:schemeClr val="tx1"/>
+          </a:fontRef>
+        </p:style>
+      </p:cxnSp>
+      <p:cxnSp>
+        <p:nvCxnSpPr>
+          <p:cNvPr id="19" name="Straight Connector 18">
+            <a:extLst>
+              <a:ext uri="{FF2B5EF4-FFF2-40B4-BE49-F238E27FC236}">
+                <a16:creationId xmlns:a16="http://schemas.microsoft.com/office/drawing/2014/main" id="{9A81A267-615F-4C79-89B2-F8317A2F8B2A}"/>
+              </a:ext>
+            </a:extLst>
+          </p:cNvPr>
+          <p:cNvCxnSpPr>
+            <a:cxnSpLocks/>
+            <a:stCxn id="4" idx="0"/>
+          </p:cNvCxnSpPr>
+          <p:nvPr/>
+        </p:nvCxnSpPr>
+        <p:spPr>
+          <a:xfrm flipH="1">
+            <a:off x="4370006" y="1047750"/>
+            <a:ext cx="1725994" cy="738513"/>
+          </a:xfrm>
+          <a:prstGeom prst="line">
+            <a:avLst/>
+          </a:prstGeom>
+          <a:ln w="28575"/>
+        </p:spPr>
+        <p:style>
+          <a:lnRef idx="1">
+            <a:schemeClr val="accent1"/>
+          </a:lnRef>
+          <a:fillRef idx="0">
+            <a:schemeClr val="accent1"/>
+          </a:fillRef>
+          <a:effectRef idx="0">
+            <a:schemeClr val="accent1"/>
+          </a:effectRef>
+          <a:fontRef idx="minor">
+            <a:schemeClr val="tx1"/>
+          </a:fontRef>
+        </p:style>
+      </p:cxnSp>
+      <p:sp>
+        <p:nvSpPr>
+          <p:cNvPr id="21" name="TextBox 20">
+            <a:extLst>
+              <a:ext uri="{FF2B5EF4-FFF2-40B4-BE49-F238E27FC236}">
+                <a16:creationId xmlns:a16="http://schemas.microsoft.com/office/drawing/2014/main" id="{B1F1F1BE-A8A5-43E8-A43A-232DF081243C}"/>
+              </a:ext>
+            </a:extLst>
+          </p:cNvPr>
+          <p:cNvSpPr txBox="1"/>
+          <p:nvPr/>
+        </p:nvSpPr>
+        <p:spPr>
+          <a:xfrm>
+            <a:off x="5529288" y="724585"/>
+            <a:ext cx="1180772" cy="369332"/>
+          </a:xfrm>
+          <a:prstGeom prst="rect">
+            <a:avLst/>
+          </a:prstGeom>
+          <a:noFill/>
+        </p:spPr>
+        <p:txBody>
+          <a:bodyPr wrap="none" rtlCol="0">
+            <a:spAutoFit/>
+          </a:bodyPr>
+          <a:lstStyle/>
+          <a:p>
+            <a:r>
+              <a:rPr lang="en-US" dirty="0"/>
+              <a:t>Spin Boxes</a:t>
+            </a:r>
+          </a:p>
+        </p:txBody>
+      </p:sp>
+      <p:cxnSp>
+        <p:nvCxnSpPr>
+          <p:cNvPr id="23" name="Straight Connector 22">
+            <a:extLst>
+              <a:ext uri="{FF2B5EF4-FFF2-40B4-BE49-F238E27FC236}">
+                <a16:creationId xmlns:a16="http://schemas.microsoft.com/office/drawing/2014/main" id="{B0FAAD42-D9D9-4E9C-A2A5-30BF55D49EB9}"/>
+              </a:ext>
+            </a:extLst>
+          </p:cNvPr>
+          <p:cNvCxnSpPr>
+            <a:cxnSpLocks/>
+          </p:cNvCxnSpPr>
+          <p:nvPr/>
+        </p:nvCxnSpPr>
+        <p:spPr>
+          <a:xfrm flipH="1">
+            <a:off x="8038214" y="3989518"/>
+            <a:ext cx="1601086" cy="0"/>
+          </a:xfrm>
+          <a:prstGeom prst="line">
+            <a:avLst/>
+          </a:prstGeom>
+          <a:ln w="28575"/>
+        </p:spPr>
+        <p:style>
+          <a:lnRef idx="1">
+            <a:schemeClr val="accent1"/>
+          </a:lnRef>
+          <a:fillRef idx="0">
+            <a:schemeClr val="accent1"/>
+          </a:fillRef>
+          <a:effectRef idx="0">
+            <a:schemeClr val="accent1"/>
+          </a:effectRef>
+          <a:fontRef idx="minor">
+            <a:schemeClr val="tx1"/>
+          </a:fontRef>
+        </p:style>
+      </p:cxnSp>
+      <p:sp>
+        <p:nvSpPr>
+          <p:cNvPr id="24" name="TextBox 23">
+            <a:extLst>
+              <a:ext uri="{FF2B5EF4-FFF2-40B4-BE49-F238E27FC236}">
+                <a16:creationId xmlns:a16="http://schemas.microsoft.com/office/drawing/2014/main" id="{A8A135A5-9F16-4DF9-8270-C74F27ED36C7}"/>
+              </a:ext>
+            </a:extLst>
+          </p:cNvPr>
+          <p:cNvSpPr txBox="1"/>
+          <p:nvPr/>
+        </p:nvSpPr>
+        <p:spPr>
+          <a:xfrm>
+            <a:off x="9589024" y="3804852"/>
+            <a:ext cx="2000099" cy="369332"/>
+          </a:xfrm>
+          <a:prstGeom prst="rect">
+            <a:avLst/>
+          </a:prstGeom>
+          <a:noFill/>
+        </p:spPr>
+        <p:txBody>
+          <a:bodyPr wrap="none" rtlCol="0">
+            <a:spAutoFit/>
+          </a:bodyPr>
+          <a:lstStyle/>
+          <a:p>
+            <a:r>
+              <a:rPr lang="en-US" dirty="0"/>
+              <a:t>Toggle Arms In/Out</a:t>
+            </a:r>
+          </a:p>
+        </p:txBody>
+      </p:sp>
     </p:spTree>
     <p:extLst>
       <p:ext uri="{BB962C8B-B14F-4D97-AF65-F5344CB8AC3E}">
@@ -3977,7 +4166,7 @@
           <a:p>
             <a:r>
               <a:rPr lang="en-US" dirty="0"/>
-              <a:t>Split Boxes Out</a:t>
+              <a:t>Spit Boxes Out</a:t>
             </a:r>
           </a:p>
         </p:txBody>
@@ -4585,6 +4774,193 @@
           </a:fontRef>
         </p:style>
       </p:cxnSp>
+      <p:cxnSp>
+        <p:nvCxnSpPr>
+          <p:cNvPr id="29" name="Straight Connector 28">
+            <a:extLst>
+              <a:ext uri="{FF2B5EF4-FFF2-40B4-BE49-F238E27FC236}">
+                <a16:creationId xmlns:a16="http://schemas.microsoft.com/office/drawing/2014/main" id="{C8BE65FE-2657-4935-BC8A-772FF34FB43C}"/>
+              </a:ext>
+            </a:extLst>
+          </p:cNvPr>
+          <p:cNvCxnSpPr>
+            <a:cxnSpLocks/>
+          </p:cNvCxnSpPr>
+          <p:nvPr/>
+        </p:nvCxnSpPr>
+        <p:spPr>
+          <a:xfrm>
+            <a:off x="6096000" y="1047750"/>
+            <a:ext cx="1743994" cy="654690"/>
+          </a:xfrm>
+          <a:prstGeom prst="line">
+            <a:avLst/>
+          </a:prstGeom>
+          <a:ln w="28575"/>
+        </p:spPr>
+        <p:style>
+          <a:lnRef idx="1">
+            <a:schemeClr val="accent1"/>
+          </a:lnRef>
+          <a:fillRef idx="0">
+            <a:schemeClr val="accent1"/>
+          </a:fillRef>
+          <a:effectRef idx="0">
+            <a:schemeClr val="accent1"/>
+          </a:effectRef>
+          <a:fontRef idx="minor">
+            <a:schemeClr val="tx1"/>
+          </a:fontRef>
+        </p:style>
+      </p:cxnSp>
+      <p:cxnSp>
+        <p:nvCxnSpPr>
+          <p:cNvPr id="31" name="Straight Connector 30">
+            <a:extLst>
+              <a:ext uri="{FF2B5EF4-FFF2-40B4-BE49-F238E27FC236}">
+                <a16:creationId xmlns:a16="http://schemas.microsoft.com/office/drawing/2014/main" id="{0C891558-FD74-451A-8637-8491FC648E94}"/>
+              </a:ext>
+            </a:extLst>
+          </p:cNvPr>
+          <p:cNvCxnSpPr>
+            <a:cxnSpLocks/>
+          </p:cNvCxnSpPr>
+          <p:nvPr/>
+        </p:nvCxnSpPr>
+        <p:spPr>
+          <a:xfrm flipH="1">
+            <a:off x="4370006" y="1047750"/>
+            <a:ext cx="1725994" cy="738513"/>
+          </a:xfrm>
+          <a:prstGeom prst="line">
+            <a:avLst/>
+          </a:prstGeom>
+          <a:ln w="28575"/>
+        </p:spPr>
+        <p:style>
+          <a:lnRef idx="1">
+            <a:schemeClr val="accent1"/>
+          </a:lnRef>
+          <a:fillRef idx="0">
+            <a:schemeClr val="accent1"/>
+          </a:fillRef>
+          <a:effectRef idx="0">
+            <a:schemeClr val="accent1"/>
+          </a:effectRef>
+          <a:fontRef idx="minor">
+            <a:schemeClr val="tx1"/>
+          </a:fontRef>
+        </p:style>
+      </p:cxnSp>
+      <p:sp>
+        <p:nvSpPr>
+          <p:cNvPr id="32" name="TextBox 31">
+            <a:extLst>
+              <a:ext uri="{FF2B5EF4-FFF2-40B4-BE49-F238E27FC236}">
+                <a16:creationId xmlns:a16="http://schemas.microsoft.com/office/drawing/2014/main" id="{A51BB18A-864C-413D-A7DD-7CA48B0A05F3}"/>
+              </a:ext>
+            </a:extLst>
+          </p:cNvPr>
+          <p:cNvSpPr txBox="1"/>
+          <p:nvPr/>
+        </p:nvSpPr>
+        <p:spPr>
+          <a:xfrm>
+            <a:off x="5529288" y="724585"/>
+            <a:ext cx="1180772" cy="369332"/>
+          </a:xfrm>
+          <a:prstGeom prst="rect">
+            <a:avLst/>
+          </a:prstGeom>
+          <a:noFill/>
+        </p:spPr>
+        <p:txBody>
+          <a:bodyPr wrap="none" rtlCol="0">
+            <a:spAutoFit/>
+          </a:bodyPr>
+          <a:lstStyle/>
+          <a:p>
+            <a:r>
+              <a:rPr lang="en-US" dirty="0"/>
+              <a:t>Spin Boxes</a:t>
+            </a:r>
+          </a:p>
+        </p:txBody>
+      </p:sp>
+      <p:cxnSp>
+        <p:nvCxnSpPr>
+          <p:cNvPr id="33" name="Straight Connector 32">
+            <a:extLst>
+              <a:ext uri="{FF2B5EF4-FFF2-40B4-BE49-F238E27FC236}">
+                <a16:creationId xmlns:a16="http://schemas.microsoft.com/office/drawing/2014/main" id="{732FDE28-2722-4B63-96AE-D46B9D895CB2}"/>
+              </a:ext>
+            </a:extLst>
+          </p:cNvPr>
+          <p:cNvCxnSpPr>
+            <a:cxnSpLocks/>
+          </p:cNvCxnSpPr>
+          <p:nvPr/>
+        </p:nvCxnSpPr>
+        <p:spPr>
+          <a:xfrm flipH="1">
+            <a:off x="8038214" y="3989518"/>
+            <a:ext cx="1601086" cy="0"/>
+          </a:xfrm>
+          <a:prstGeom prst="line">
+            <a:avLst/>
+          </a:prstGeom>
+          <a:ln w="28575"/>
+        </p:spPr>
+        <p:style>
+          <a:lnRef idx="1">
+            <a:schemeClr val="accent1"/>
+          </a:lnRef>
+          <a:fillRef idx="0">
+            <a:schemeClr val="accent1"/>
+          </a:fillRef>
+          <a:effectRef idx="0">
+            <a:schemeClr val="accent1"/>
+          </a:effectRef>
+          <a:fontRef idx="minor">
+            <a:schemeClr val="tx1"/>
+          </a:fontRef>
+        </p:style>
+      </p:cxnSp>
+      <p:sp>
+        <p:nvSpPr>
+          <p:cNvPr id="34" name="TextBox 33">
+            <a:extLst>
+              <a:ext uri="{FF2B5EF4-FFF2-40B4-BE49-F238E27FC236}">
+                <a16:creationId xmlns:a16="http://schemas.microsoft.com/office/drawing/2014/main" id="{FF7A364E-AFCF-401A-87F2-A509376F8360}"/>
+              </a:ext>
+            </a:extLst>
+          </p:cNvPr>
+          <p:cNvSpPr txBox="1"/>
+          <p:nvPr/>
+        </p:nvSpPr>
+        <p:spPr>
+          <a:xfrm>
+            <a:off x="9589024" y="3804852"/>
+            <a:ext cx="2000099" cy="369332"/>
+          </a:xfrm>
+          <a:prstGeom prst="rect">
+            <a:avLst/>
+          </a:prstGeom>
+          <a:noFill/>
+        </p:spPr>
+        <p:txBody>
+          <a:bodyPr wrap="none" rtlCol="0">
+            <a:spAutoFit/>
+          </a:bodyPr>
+          <a:lstStyle/>
+          <a:p>
+            <a:r>
+              <a:rPr lang="en-US" dirty="0"/>
+              <a:t>Toggle Arms In/Out</a:t>
+            </a:r>
+          </a:p>
+        </p:txBody>
+      </p:sp>
     </p:spTree>
     <p:extLst>
       <p:ext uri="{BB962C8B-B14F-4D97-AF65-F5344CB8AC3E}">

</xml_diff>